<commit_message>
updated next steps in slides
</commit_message>
<xml_diff>
--- a/outputs/Final Deliverables.pptx
+++ b/outputs/Final Deliverables.pptx
@@ -3548,7 +3548,7 @@
           <a:p>
             <a:fld id="{7B53714C-EB9D-4414-B15B-CB3CC2BB34E4}" type="datetimeFigureOut">
               <a:rPr lang="en-IN" smtClean="0"/>
-              <a:t>18-02-2026</a:t>
+              <a:t>19-02-2026</a:t>
             </a:fld>
             <a:endParaRPr lang="en-IN"/>
           </a:p>
@@ -4481,7 +4481,7 @@
           <a:p>
             <a:fld id="{F643EDFF-7427-45C4-9B36-95BD80D4DD61}" type="datetimeFigureOut">
               <a:rPr lang="en-IN" smtClean="0"/>
-              <a:t>18-02-2026</a:t>
+              <a:t>19-02-2026</a:t>
             </a:fld>
             <a:endParaRPr lang="en-IN"/>
           </a:p>
@@ -4681,7 +4681,7 @@
           <a:p>
             <a:fld id="{F643EDFF-7427-45C4-9B36-95BD80D4DD61}" type="datetimeFigureOut">
               <a:rPr lang="en-IN" smtClean="0"/>
-              <a:t>18-02-2026</a:t>
+              <a:t>19-02-2026</a:t>
             </a:fld>
             <a:endParaRPr lang="en-IN"/>
           </a:p>
@@ -4891,7 +4891,7 @@
           <a:p>
             <a:fld id="{F643EDFF-7427-45C4-9B36-95BD80D4DD61}" type="datetimeFigureOut">
               <a:rPr lang="en-IN" smtClean="0"/>
-              <a:t>18-02-2026</a:t>
+              <a:t>19-02-2026</a:t>
             </a:fld>
             <a:endParaRPr lang="en-IN"/>
           </a:p>
@@ -5091,7 +5091,7 @@
           <a:p>
             <a:fld id="{F643EDFF-7427-45C4-9B36-95BD80D4DD61}" type="datetimeFigureOut">
               <a:rPr lang="en-IN" smtClean="0"/>
-              <a:t>18-02-2026</a:t>
+              <a:t>19-02-2026</a:t>
             </a:fld>
             <a:endParaRPr lang="en-IN"/>
           </a:p>
@@ -5367,7 +5367,7 @@
           <a:p>
             <a:fld id="{F643EDFF-7427-45C4-9B36-95BD80D4DD61}" type="datetimeFigureOut">
               <a:rPr lang="en-IN" smtClean="0"/>
-              <a:t>18-02-2026</a:t>
+              <a:t>19-02-2026</a:t>
             </a:fld>
             <a:endParaRPr lang="en-IN"/>
           </a:p>
@@ -5635,7 +5635,7 @@
           <a:p>
             <a:fld id="{F643EDFF-7427-45C4-9B36-95BD80D4DD61}" type="datetimeFigureOut">
               <a:rPr lang="en-IN" smtClean="0"/>
-              <a:t>18-02-2026</a:t>
+              <a:t>19-02-2026</a:t>
             </a:fld>
             <a:endParaRPr lang="en-IN"/>
           </a:p>
@@ -6050,7 +6050,7 @@
           <a:p>
             <a:fld id="{F643EDFF-7427-45C4-9B36-95BD80D4DD61}" type="datetimeFigureOut">
               <a:rPr lang="en-IN" smtClean="0"/>
-              <a:t>18-02-2026</a:t>
+              <a:t>19-02-2026</a:t>
             </a:fld>
             <a:endParaRPr lang="en-IN"/>
           </a:p>
@@ -6192,7 +6192,7 @@
           <a:p>
             <a:fld id="{F643EDFF-7427-45C4-9B36-95BD80D4DD61}" type="datetimeFigureOut">
               <a:rPr lang="en-IN" smtClean="0"/>
-              <a:t>18-02-2026</a:t>
+              <a:t>19-02-2026</a:t>
             </a:fld>
             <a:endParaRPr lang="en-IN"/>
           </a:p>
@@ -6305,7 +6305,7 @@
           <a:p>
             <a:fld id="{F643EDFF-7427-45C4-9B36-95BD80D4DD61}" type="datetimeFigureOut">
               <a:rPr lang="en-IN" smtClean="0"/>
-              <a:t>18-02-2026</a:t>
+              <a:t>19-02-2026</a:t>
             </a:fld>
             <a:endParaRPr lang="en-IN"/>
           </a:p>
@@ -6618,7 +6618,7 @@
           <a:p>
             <a:fld id="{F643EDFF-7427-45C4-9B36-95BD80D4DD61}" type="datetimeFigureOut">
               <a:rPr lang="en-IN" smtClean="0"/>
-              <a:t>18-02-2026</a:t>
+              <a:t>19-02-2026</a:t>
             </a:fld>
             <a:endParaRPr lang="en-IN"/>
           </a:p>
@@ -6907,7 +6907,7 @@
           <a:p>
             <a:fld id="{F643EDFF-7427-45C4-9B36-95BD80D4DD61}" type="datetimeFigureOut">
               <a:rPr lang="en-IN" smtClean="0"/>
-              <a:t>18-02-2026</a:t>
+              <a:t>19-02-2026</a:t>
             </a:fld>
             <a:endParaRPr lang="en-IN"/>
           </a:p>
@@ -7150,7 +7150,7 @@
           <a:p>
             <a:fld id="{F643EDFF-7427-45C4-9B36-95BD80D4DD61}" type="datetimeFigureOut">
               <a:rPr lang="en-IN" smtClean="0"/>
-              <a:t>18-02-2026</a:t>
+              <a:t>19-02-2026</a:t>
             </a:fld>
             <a:endParaRPr lang="en-IN"/>
           </a:p>
@@ -13865,10 +13865,18 @@
                 <a:ea typeface="Roboto Light" panose="02000000000000000000" pitchFamily="2" charset="0"/>
                 <a:cs typeface="Roboto Light" panose="02000000000000000000" pitchFamily="2" charset="0"/>
               </a:rPr>
-              <a:t>The sensitivity analysis helped us identify and quantify each feature’s individual impact by averaging out the effects of all other features. (Helps in answering “</a:t>
+              <a:t>The sensitivity analysis helped us identify and quantify each feature’s individual impact by averaging out the effects of all other features</a:t>
             </a:r>
             <a:r>
-              <a:rPr lang="en-IN" sz="1600" dirty="0">
+              <a:rPr lang="en-US" sz="1600" b="1" dirty="0">
+                <a:latin typeface="Roboto Light" panose="02000000000000000000" pitchFamily="2" charset="0"/>
+                <a:ea typeface="Roboto Light" panose="02000000000000000000" pitchFamily="2" charset="0"/>
+                <a:cs typeface="Roboto Light" panose="02000000000000000000" pitchFamily="2" charset="0"/>
+              </a:rPr>
+              <a:t>. (Helps in answering “</a:t>
+            </a:r>
+            <a:r>
+              <a:rPr lang="en-IN" sz="1600" b="1" dirty="0">
                 <a:latin typeface="Roboto Light" panose="02000000000000000000" pitchFamily="2" charset="0"/>
                 <a:ea typeface="Roboto Light" panose="02000000000000000000" pitchFamily="2" charset="0"/>
                 <a:cs typeface="Roboto Light" panose="02000000000000000000" pitchFamily="2" charset="0"/>
@@ -13876,14 +13884,14 @@
               <a:t>cookie-based sweets”</a:t>
             </a:r>
             <a:r>
-              <a:rPr lang="en-US" sz="1600" dirty="0">
+              <a:rPr lang="en-US" sz="1600" b="1" dirty="0">
                 <a:latin typeface="Roboto Light" panose="02000000000000000000" pitchFamily="2" charset="0"/>
                 <a:ea typeface="Roboto Light" panose="02000000000000000000" pitchFamily="2" charset="0"/>
                 <a:cs typeface="Roboto Light" panose="02000000000000000000" pitchFamily="2" charset="0"/>
               </a:rPr>
               <a:t> or “cookie”? type questions).</a:t>
             </a:r>
-            <a:endParaRPr lang="en-IN" sz="1600" dirty="0">
+            <a:endParaRPr lang="en-IN" sz="1600" b="1" dirty="0">
               <a:latin typeface="Roboto Light" panose="02000000000000000000" pitchFamily="2" charset="0"/>
               <a:ea typeface="Roboto Light" panose="02000000000000000000" pitchFamily="2" charset="0"/>
               <a:cs typeface="Roboto Light" panose="02000000000000000000" pitchFamily="2" charset="0"/>
@@ -15289,7 +15297,7 @@
         <p:spPr>
           <a:xfrm>
             <a:off x="803276" y="1351724"/>
-            <a:ext cx="10849294" cy="2031325"/>
+            <a:ext cx="5841364" cy="4524315"/>
           </a:xfrm>
           <a:prstGeom prst="rect">
             <a:avLst/>
@@ -15304,62 +15312,165 @@
           <a:p>
             <a:r>
               <a:rPr lang="en-IN" dirty="0">
-                <a:latin typeface="Roboto" panose="02000000000000000000" pitchFamily="2" charset="0"/>
-                <a:ea typeface="Roboto" panose="02000000000000000000" pitchFamily="2" charset="0"/>
-                <a:cs typeface="Roboto" panose="02000000000000000000" pitchFamily="2" charset="0"/>
+                <a:latin typeface="Roboto Light" panose="02000000000000000000" pitchFamily="2" charset="0"/>
+                <a:ea typeface="Roboto Light" panose="02000000000000000000" pitchFamily="2" charset="0"/>
+                <a:cs typeface="Roboto Light" panose="02000000000000000000" pitchFamily="2" charset="0"/>
               </a:rPr>
               <a:t>Can give more exploitation recommendations from different regions in design space.</a:t>
             </a:r>
           </a:p>
           <a:p>
             <a:endParaRPr lang="en-IN" dirty="0">
-              <a:latin typeface="Roboto" panose="02000000000000000000" pitchFamily="2" charset="0"/>
-              <a:ea typeface="Roboto" panose="02000000000000000000" pitchFamily="2" charset="0"/>
-              <a:cs typeface="Roboto" panose="02000000000000000000" pitchFamily="2" charset="0"/>
+              <a:latin typeface="Roboto Light" panose="02000000000000000000" pitchFamily="2" charset="0"/>
+              <a:ea typeface="Roboto Light" panose="02000000000000000000" pitchFamily="2" charset="0"/>
+              <a:cs typeface="Roboto Light" panose="02000000000000000000" pitchFamily="2" charset="0"/>
             </a:endParaRPr>
           </a:p>
           <a:p>
             <a:r>
               <a:rPr lang="en-IN" dirty="0">
-                <a:latin typeface="Roboto" panose="02000000000000000000" pitchFamily="2" charset="0"/>
-                <a:ea typeface="Roboto" panose="02000000000000000000" pitchFamily="2" charset="0"/>
-                <a:cs typeface="Roboto" panose="02000000000000000000" pitchFamily="2" charset="0"/>
+                <a:latin typeface="Roboto Light" panose="02000000000000000000" pitchFamily="2" charset="0"/>
+                <a:ea typeface="Roboto Light" panose="02000000000000000000" pitchFamily="2" charset="0"/>
+                <a:cs typeface="Roboto Light" panose="02000000000000000000" pitchFamily="2" charset="0"/>
               </a:rPr>
-              <a:t>We can engineer a metric to select optimal points (to balance this exploration exploitation strategy), some options could be</a:t>
+              <a:t>We can engineer a metric to select optimal points (to balance this exploration exploitation strategy), some options could be -</a:t>
             </a:r>
           </a:p>
           <a:p>
+            <a:pPr marL="285750" indent="-285750">
+              <a:buFont typeface="Arial" panose="020B0604020202020204" pitchFamily="34" charset="0"/>
+              <a:buChar char="•"/>
+            </a:pPr>
             <a:r>
               <a:rPr lang="en-IN" dirty="0">
-                <a:latin typeface="Roboto" panose="02000000000000000000" pitchFamily="2" charset="0"/>
-                <a:ea typeface="Roboto" panose="02000000000000000000" pitchFamily="2" charset="0"/>
-                <a:cs typeface="Roboto" panose="02000000000000000000" pitchFamily="2" charset="0"/>
+                <a:latin typeface="Roboto Light" panose="02000000000000000000" pitchFamily="2" charset="0"/>
+                <a:ea typeface="Roboto Light" panose="02000000000000000000" pitchFamily="2" charset="0"/>
+                <a:cs typeface="Roboto Light" panose="02000000000000000000" pitchFamily="2" charset="0"/>
               </a:rPr>
-              <a:t>	- Promote diversity in feature space and best predicted values</a:t>
+              <a:t>Promote diversity in feature space and best predicted values</a:t>
             </a:r>
           </a:p>
           <a:p>
+            <a:pPr marL="285750" indent="-285750">
+              <a:buFont typeface="Arial" panose="020B0604020202020204" pitchFamily="34" charset="0"/>
+              <a:buChar char="•"/>
+            </a:pPr>
             <a:r>
               <a:rPr lang="en-IN" dirty="0">
-                <a:latin typeface="Roboto" panose="02000000000000000000" pitchFamily="2" charset="0"/>
-                <a:ea typeface="Roboto" panose="02000000000000000000" pitchFamily="2" charset="0"/>
-                <a:cs typeface="Roboto" panose="02000000000000000000" pitchFamily="2" charset="0"/>
+                <a:latin typeface="Roboto Light" panose="02000000000000000000" pitchFamily="2" charset="0"/>
+                <a:ea typeface="Roboto Light" panose="02000000000000000000" pitchFamily="2" charset="0"/>
+                <a:cs typeface="Roboto Light" panose="02000000000000000000" pitchFamily="2" charset="0"/>
               </a:rPr>
-              <a:t>	- Most uncertain (most unexplored region)</a:t>
+              <a:t>Most uncertain (most unexplored region)</a:t>
             </a:r>
           </a:p>
           <a:p>
+            <a:pPr marL="285750" indent="-285750">
+              <a:buFont typeface="Arial" panose="020B0604020202020204" pitchFamily="34" charset="0"/>
+              <a:buChar char="•"/>
+            </a:pPr>
             <a:r>
               <a:rPr lang="en-IN" dirty="0">
-                <a:latin typeface="Roboto" panose="02000000000000000000" pitchFamily="2" charset="0"/>
-                <a:ea typeface="Roboto" panose="02000000000000000000" pitchFamily="2" charset="0"/>
-                <a:cs typeface="Roboto" panose="02000000000000000000" pitchFamily="2" charset="0"/>
+                <a:latin typeface="Roboto Light" panose="02000000000000000000" pitchFamily="2" charset="0"/>
+                <a:ea typeface="Roboto Light" panose="02000000000000000000" pitchFamily="2" charset="0"/>
+                <a:cs typeface="Roboto Light" panose="02000000000000000000" pitchFamily="2" charset="0"/>
               </a:rPr>
-              <a:t>	- Bayesian optimisation (Expected improvement)</a:t>
+              <a:t>Bayesian optimisation (Expected improvement) </a:t>
             </a:r>
+          </a:p>
+          <a:p>
+            <a:endParaRPr lang="en-IN" dirty="0">
+              <a:latin typeface="Roboto Light" panose="02000000000000000000" pitchFamily="2" charset="0"/>
+              <a:ea typeface="Roboto Light" panose="02000000000000000000" pitchFamily="2" charset="0"/>
+              <a:cs typeface="Roboto Light" panose="02000000000000000000" pitchFamily="2" charset="0"/>
+            </a:endParaRPr>
+          </a:p>
+          <a:p>
+            <a:r>
+              <a:rPr lang="en-IN" dirty="0">
+                <a:latin typeface="Roboto Light" panose="02000000000000000000" pitchFamily="2" charset="0"/>
+                <a:ea typeface="Roboto Light" panose="02000000000000000000" pitchFamily="2" charset="0"/>
+                <a:cs typeface="Roboto Light" panose="02000000000000000000" pitchFamily="2" charset="0"/>
+              </a:rPr>
+              <a:t>Dataset can be updated -</a:t>
+            </a:r>
+          </a:p>
+          <a:p>
+            <a:pPr marL="285750" indent="-285750">
+              <a:buFont typeface="Arial" panose="020B0604020202020204" pitchFamily="34" charset="0"/>
+              <a:buChar char="•"/>
+            </a:pPr>
+            <a:r>
+              <a:rPr lang="en-IN" dirty="0">
+                <a:latin typeface="Roboto Light" panose="02000000000000000000" pitchFamily="2" charset="0"/>
+                <a:ea typeface="Roboto Light" panose="02000000000000000000" pitchFamily="2" charset="0"/>
+                <a:cs typeface="Roboto Light" panose="02000000000000000000" pitchFamily="2" charset="0"/>
+              </a:rPr>
+              <a:t>Compositions rather than just Boolean flags</a:t>
+            </a:r>
+          </a:p>
+          <a:p>
+            <a:pPr marL="285750" indent="-285750">
+              <a:buFont typeface="Arial" panose="020B0604020202020204" pitchFamily="34" charset="0"/>
+              <a:buChar char="•"/>
+            </a:pPr>
+            <a:r>
+              <a:rPr lang="en-IN" dirty="0">
+                <a:latin typeface="Roboto Light" panose="02000000000000000000" pitchFamily="2" charset="0"/>
+                <a:ea typeface="Roboto Light" panose="02000000000000000000" pitchFamily="2" charset="0"/>
+                <a:cs typeface="Roboto Light" panose="02000000000000000000" pitchFamily="2" charset="0"/>
+              </a:rPr>
+              <a:t>Rather than just customer liking based on A/B test, use sales metrics.</a:t>
+            </a:r>
+          </a:p>
+          <a:p>
+            <a:endParaRPr lang="en-IN" dirty="0">
+              <a:latin typeface="Roboto Light" panose="02000000000000000000" pitchFamily="2" charset="0"/>
+              <a:ea typeface="Roboto Light" panose="02000000000000000000" pitchFamily="2" charset="0"/>
+              <a:cs typeface="Roboto Light" panose="02000000000000000000" pitchFamily="2" charset="0"/>
+            </a:endParaRPr>
           </a:p>
         </p:txBody>
       </p:sp>
+      <p:pic>
+        <p:nvPicPr>
+          <p:cNvPr id="2" name="Graphic 1" descr="Train Tracks with solid fill">
+            <a:extLst>
+              <a:ext uri="{FF2B5EF4-FFF2-40B4-BE49-F238E27FC236}">
+                <a16:creationId xmlns:a16="http://schemas.microsoft.com/office/drawing/2014/main" id="{76196827-C9C1-5F10-32E0-B424894356B9}"/>
+              </a:ext>
+            </a:extLst>
+          </p:cNvPr>
+          <p:cNvPicPr>
+            <a:picLocks noChangeAspect="1"/>
+          </p:cNvPicPr>
+          <p:nvPr/>
+        </p:nvPicPr>
+        <p:blipFill>
+          <a:blip r:embed="rId3">
+            <a:extLst>
+              <a:ext uri="{28A0092B-C50C-407E-A947-70E740481C1C}">
+                <a14:useLocalDpi xmlns:a14="http://schemas.microsoft.com/office/drawing/2010/main" val="0"/>
+              </a:ext>
+              <a:ext uri="{96DAC541-7B7A-43D3-8B79-37D633B846F1}">
+                <asvg:svgBlip xmlns:asvg="http://schemas.microsoft.com/office/drawing/2016/SVG/main" r:embed="rId4"/>
+              </a:ext>
+            </a:extLst>
+          </a:blip>
+          <a:stretch>
+            <a:fillRect/>
+          </a:stretch>
+        </p:blipFill>
+        <p:spPr>
+          <a:xfrm>
+            <a:off x="6865284" y="1142760"/>
+            <a:ext cx="4271682" cy="4271682"/>
+          </a:xfrm>
+          <a:prstGeom prst="rect">
+            <a:avLst/>
+          </a:prstGeom>
+        </p:spPr>
+      </p:pic>
     </p:spTree>
     <p:extLst>
       <p:ext uri="{BB962C8B-B14F-4D97-AF65-F5344CB8AC3E}">

</xml_diff>